<commit_message>
fix(combined): play button after pause works while robot is in paused mode
</commit_message>
<xml_diff>
--- a/Finite_State_Diagram.pptx
+++ b/Finite_State_Diagram.pptx
@@ -106,6 +106,11 @@
       </a:defRPr>
     </a:lvl9pPr>
   </p:defaultTextStyle>
+  <p:extLst>
+    <p:ext uri="{EFAFB233-063F-42B5-8137-9DF3F51BA10A}">
+      <p15:sldGuideLst xmlns:p15="http://schemas.microsoft.com/office/powerpoint/2012/main"/>
+    </p:ext>
+  </p:extLst>
 </p:presentation>
 </file>
 
@@ -256,7 +261,7 @@
           <a:p>
             <a:fld id="{9938F40F-B370-44D9-BC10-C4E41A143A54}" type="datetimeFigureOut">
               <a:rPr lang="en-US" smtClean="0"/>
-              <a:t>9/16/2021</a:t>
+              <a:t>9/17/2021</a:t>
             </a:fld>
             <a:endParaRPr lang="en-US"/>
           </a:p>
@@ -454,7 +459,7 @@
           <a:p>
             <a:fld id="{9938F40F-B370-44D9-BC10-C4E41A143A54}" type="datetimeFigureOut">
               <a:rPr lang="en-US" smtClean="0"/>
-              <a:t>9/16/2021</a:t>
+              <a:t>9/17/2021</a:t>
             </a:fld>
             <a:endParaRPr lang="en-US"/>
           </a:p>
@@ -662,7 +667,7 @@
           <a:p>
             <a:fld id="{9938F40F-B370-44D9-BC10-C4E41A143A54}" type="datetimeFigureOut">
               <a:rPr lang="en-US" smtClean="0"/>
-              <a:t>9/16/2021</a:t>
+              <a:t>9/17/2021</a:t>
             </a:fld>
             <a:endParaRPr lang="en-US"/>
           </a:p>
@@ -860,7 +865,7 @@
           <a:p>
             <a:fld id="{9938F40F-B370-44D9-BC10-C4E41A143A54}" type="datetimeFigureOut">
               <a:rPr lang="en-US" smtClean="0"/>
-              <a:t>9/16/2021</a:t>
+              <a:t>9/17/2021</a:t>
             </a:fld>
             <a:endParaRPr lang="en-US"/>
           </a:p>
@@ -1135,7 +1140,7 @@
           <a:p>
             <a:fld id="{9938F40F-B370-44D9-BC10-C4E41A143A54}" type="datetimeFigureOut">
               <a:rPr lang="en-US" smtClean="0"/>
-              <a:t>9/16/2021</a:t>
+              <a:t>9/17/2021</a:t>
             </a:fld>
             <a:endParaRPr lang="en-US"/>
           </a:p>
@@ -1400,7 +1405,7 @@
           <a:p>
             <a:fld id="{9938F40F-B370-44D9-BC10-C4E41A143A54}" type="datetimeFigureOut">
               <a:rPr lang="en-US" smtClean="0"/>
-              <a:t>9/16/2021</a:t>
+              <a:t>9/17/2021</a:t>
             </a:fld>
             <a:endParaRPr lang="en-US"/>
           </a:p>
@@ -1812,7 +1817,7 @@
           <a:p>
             <a:fld id="{9938F40F-B370-44D9-BC10-C4E41A143A54}" type="datetimeFigureOut">
               <a:rPr lang="en-US" smtClean="0"/>
-              <a:t>9/16/2021</a:t>
+              <a:t>9/17/2021</a:t>
             </a:fld>
             <a:endParaRPr lang="en-US"/>
           </a:p>
@@ -1953,7 +1958,7 @@
           <a:p>
             <a:fld id="{9938F40F-B370-44D9-BC10-C4E41A143A54}" type="datetimeFigureOut">
               <a:rPr lang="en-US" smtClean="0"/>
-              <a:t>9/16/2021</a:t>
+              <a:t>9/17/2021</a:t>
             </a:fld>
             <a:endParaRPr lang="en-US"/>
           </a:p>
@@ -2066,7 +2071,7 @@
           <a:p>
             <a:fld id="{9938F40F-B370-44D9-BC10-C4E41A143A54}" type="datetimeFigureOut">
               <a:rPr lang="en-US" smtClean="0"/>
-              <a:t>9/16/2021</a:t>
+              <a:t>9/17/2021</a:t>
             </a:fld>
             <a:endParaRPr lang="en-US"/>
           </a:p>
@@ -2377,7 +2382,7 @@
           <a:p>
             <a:fld id="{9938F40F-B370-44D9-BC10-C4E41A143A54}" type="datetimeFigureOut">
               <a:rPr lang="en-US" smtClean="0"/>
-              <a:t>9/16/2021</a:t>
+              <a:t>9/17/2021</a:t>
             </a:fld>
             <a:endParaRPr lang="en-US"/>
           </a:p>
@@ -2665,7 +2670,7 @@
           <a:p>
             <a:fld id="{9938F40F-B370-44D9-BC10-C4E41A143A54}" type="datetimeFigureOut">
               <a:rPr lang="en-US" smtClean="0"/>
-              <a:t>9/16/2021</a:t>
+              <a:t>9/17/2021</a:t>
             </a:fld>
             <a:endParaRPr lang="en-US"/>
           </a:p>
@@ -2906,7 +2911,7 @@
           <a:p>
             <a:fld id="{9938F40F-B370-44D9-BC10-C4E41A143A54}" type="datetimeFigureOut">
               <a:rPr lang="en-US" smtClean="0"/>
-              <a:t>9/16/2021</a:t>
+              <a:t>9/17/2021</a:t>
             </a:fld>
             <a:endParaRPr lang="en-US"/>
           </a:p>
@@ -3432,7 +3437,7 @@
         </p:nvSpPr>
         <p:spPr>
           <a:xfrm>
-            <a:off x="2247900" y="3509965"/>
+            <a:off x="2438400" y="3509965"/>
             <a:ext cx="1095375" cy="1095375"/>
           </a:xfrm>
           <a:prstGeom prst="ellipse">
@@ -3491,7 +3496,7 @@
         </p:nvSpPr>
         <p:spPr>
           <a:xfrm>
-            <a:off x="4352925" y="3509964"/>
+            <a:off x="4543425" y="3509964"/>
             <a:ext cx="1095375" cy="1095375"/>
           </a:xfrm>
           <a:prstGeom prst="ellipse">
@@ -3550,7 +3555,7 @@
         </p:nvSpPr>
         <p:spPr>
           <a:xfrm>
-            <a:off x="6457950" y="3509963"/>
+            <a:off x="6648450" y="3509963"/>
             <a:ext cx="1095375" cy="1095375"/>
           </a:xfrm>
           <a:prstGeom prst="ellipse">
@@ -3609,7 +3614,7 @@
         </p:nvSpPr>
         <p:spPr>
           <a:xfrm>
-            <a:off x="8562975" y="3509963"/>
+            <a:off x="8753475" y="3509963"/>
             <a:ext cx="1095375" cy="1095375"/>
           </a:xfrm>
           <a:prstGeom prst="ellipse">
@@ -3668,7 +3673,7 @@
         </p:nvSpPr>
         <p:spPr>
           <a:xfrm>
-            <a:off x="10668000" y="3509962"/>
+            <a:off x="10858500" y="3509962"/>
             <a:ext cx="1095375" cy="1095375"/>
           </a:xfrm>
           <a:prstGeom prst="ellipse">
@@ -3727,7 +3732,7 @@
         </p:nvSpPr>
         <p:spPr>
           <a:xfrm>
-            <a:off x="142875" y="3509962"/>
+            <a:off x="333375" y="3509962"/>
             <a:ext cx="1095375" cy="1095375"/>
           </a:xfrm>
           <a:prstGeom prst="ellipse">
@@ -3789,7 +3794,7 @@
         </p:nvCxnSpPr>
         <p:spPr>
           <a:xfrm>
-            <a:off x="1238250" y="4057650"/>
+            <a:off x="1428750" y="4057650"/>
             <a:ext cx="1009650" cy="3"/>
           </a:xfrm>
           <a:prstGeom prst="straightConnector1">
@@ -3828,8 +3833,8 @@
         </p:nvSpPr>
         <p:spPr>
           <a:xfrm>
-            <a:off x="6010275" y="-1"/>
-            <a:ext cx="5391150" cy="2585323"/>
+            <a:off x="6010274" y="-1"/>
+            <a:ext cx="6181725" cy="2862322"/>
           </a:xfrm>
           <a:prstGeom prst="rect">
             <a:avLst/>
@@ -3856,7 +3861,7 @@
           <a:p>
             <a:r>
               <a:rPr lang="en-US" dirty="0"/>
-              <a:t>0.   Play button pressed (Crucible ready)</a:t>
+              <a:t>0.   Play button pressed in both idle status (Crucible ready)</a:t>
             </a:r>
           </a:p>
           <a:p>
@@ -3874,7 +3879,7 @@
             </a:pPr>
             <a:r>
               <a:rPr lang="en-US" dirty="0"/>
-              <a:t>Furnace ramp heating</a:t>
+              <a:t>Furnace heating is done</a:t>
             </a:r>
           </a:p>
           <a:p>
@@ -3910,7 +3915,7 @@
             </a:pPr>
             <a:r>
               <a:rPr lang="en-US" dirty="0"/>
-              <a:t>Pause button pressed/unpressed</a:t>
+              <a:t>Pause button pressed or Play button pressed while robot is paused (indicating that previously there is a pause event)</a:t>
             </a:r>
           </a:p>
         </p:txBody>
@@ -3933,7 +3938,7 @@
         </p:nvCxnSpPr>
         <p:spPr>
           <a:xfrm flipV="1">
-            <a:off x="3343275" y="4057652"/>
+            <a:off x="3533775" y="4057652"/>
             <a:ext cx="1009650" cy="1"/>
           </a:xfrm>
           <a:prstGeom prst="straightConnector1">
@@ -3972,7 +3977,7 @@
         </p:nvSpPr>
         <p:spPr>
           <a:xfrm>
-            <a:off x="5467350" y="5738635"/>
+            <a:off x="5657850" y="5738635"/>
             <a:ext cx="1095375" cy="1095375"/>
           </a:xfrm>
           <a:prstGeom prst="ellipse">
@@ -4035,7 +4040,7 @@
         </p:nvCxnSpPr>
         <p:spPr>
           <a:xfrm>
-            <a:off x="690563" y="4605337"/>
+            <a:off x="881063" y="4605337"/>
             <a:ext cx="4776787" cy="1680986"/>
           </a:xfrm>
           <a:prstGeom prst="straightConnector1">
@@ -4078,7 +4083,7 @@
         </p:nvCxnSpPr>
         <p:spPr>
           <a:xfrm>
-            <a:off x="2795588" y="4605340"/>
+            <a:off x="2986088" y="4605340"/>
             <a:ext cx="2832176" cy="1293709"/>
           </a:xfrm>
           <a:prstGeom prst="straightConnector1">
@@ -4121,7 +4126,7 @@
         </p:nvCxnSpPr>
         <p:spPr>
           <a:xfrm>
-            <a:off x="4900613" y="4605339"/>
+            <a:off x="5091113" y="4605339"/>
             <a:ext cx="1114425" cy="1133296"/>
           </a:xfrm>
           <a:prstGeom prst="straightConnector1">
@@ -4164,7 +4169,7 @@
         </p:nvCxnSpPr>
         <p:spPr>
           <a:xfrm flipH="1">
-            <a:off x="6015038" y="4605338"/>
+            <a:off x="6205538" y="4605338"/>
             <a:ext cx="990600" cy="1133297"/>
           </a:xfrm>
           <a:prstGeom prst="straightConnector1">
@@ -4207,7 +4212,7 @@
         </p:nvCxnSpPr>
         <p:spPr>
           <a:xfrm flipH="1">
-            <a:off x="6402311" y="4605338"/>
+            <a:off x="6592811" y="4605338"/>
             <a:ext cx="2708352" cy="1293711"/>
           </a:xfrm>
           <a:prstGeom prst="straightConnector1">
@@ -4250,7 +4255,7 @@
         </p:nvCxnSpPr>
         <p:spPr>
           <a:xfrm flipH="1">
-            <a:off x="6562725" y="4605337"/>
+            <a:off x="6753225" y="4605337"/>
             <a:ext cx="4652963" cy="1680986"/>
           </a:xfrm>
           <a:prstGeom prst="straightConnector1">
@@ -4289,7 +4294,7 @@
         </p:nvSpPr>
         <p:spPr>
           <a:xfrm>
-            <a:off x="2795587" y="5021362"/>
+            <a:off x="2986087" y="5021362"/>
             <a:ext cx="434734" cy="461665"/>
           </a:xfrm>
           <a:prstGeom prst="rect">
@@ -4324,7 +4329,7 @@
         </p:nvSpPr>
         <p:spPr>
           <a:xfrm>
-            <a:off x="3815435" y="4710321"/>
+            <a:off x="4005935" y="4710321"/>
             <a:ext cx="434734" cy="461665"/>
           </a:xfrm>
           <a:prstGeom prst="rect">
@@ -4359,7 +4364,7 @@
         </p:nvSpPr>
         <p:spPr>
           <a:xfrm>
-            <a:off x="5240458" y="4643260"/>
+            <a:off x="5430958" y="4643260"/>
             <a:ext cx="434734" cy="461665"/>
           </a:xfrm>
           <a:prstGeom prst="rect">
@@ -4394,7 +4399,7 @@
         </p:nvSpPr>
         <p:spPr>
           <a:xfrm>
-            <a:off x="6302495" y="4643260"/>
+            <a:off x="6492995" y="4643260"/>
             <a:ext cx="434734" cy="461665"/>
           </a:xfrm>
           <a:prstGeom prst="rect">
@@ -4429,7 +4434,7 @@
         </p:nvSpPr>
         <p:spPr>
           <a:xfrm>
-            <a:off x="7789908" y="4710321"/>
+            <a:off x="7980408" y="4710321"/>
             <a:ext cx="434734" cy="461665"/>
           </a:xfrm>
           <a:prstGeom prst="rect">
@@ -4464,7 +4469,7 @@
         </p:nvSpPr>
         <p:spPr>
           <a:xfrm>
-            <a:off x="8942236" y="4919395"/>
+            <a:off x="9132736" y="4919395"/>
             <a:ext cx="434734" cy="461665"/>
           </a:xfrm>
           <a:prstGeom prst="rect">
@@ -4499,7 +4504,7 @@
         </p:nvSpPr>
         <p:spPr>
           <a:xfrm>
-            <a:off x="1525708" y="3509962"/>
+            <a:off x="1716208" y="3509962"/>
             <a:ext cx="340158" cy="461665"/>
           </a:xfrm>
           <a:prstGeom prst="rect">
@@ -4534,7 +4539,7 @@
         </p:nvSpPr>
         <p:spPr>
           <a:xfrm>
-            <a:off x="3650201" y="3509961"/>
+            <a:off x="3840701" y="3509961"/>
             <a:ext cx="340158" cy="461665"/>
           </a:xfrm>
           <a:prstGeom prst="rect">
@@ -4573,7 +4578,7 @@
         </p:nvCxnSpPr>
         <p:spPr>
           <a:xfrm flipV="1">
-            <a:off x="5448300" y="4057651"/>
+            <a:off x="5638800" y="4057651"/>
             <a:ext cx="1009650" cy="1"/>
           </a:xfrm>
           <a:prstGeom prst="straightConnector1">
@@ -4612,7 +4617,7 @@
         </p:nvSpPr>
         <p:spPr>
           <a:xfrm>
-            <a:off x="5840196" y="3503652"/>
+            <a:off x="6030696" y="3503652"/>
             <a:ext cx="340158" cy="461665"/>
           </a:xfrm>
           <a:prstGeom prst="rect">
@@ -4651,7 +4656,7 @@
         </p:nvCxnSpPr>
         <p:spPr>
           <a:xfrm>
-            <a:off x="7553325" y="4057651"/>
+            <a:off x="7743825" y="4057651"/>
             <a:ext cx="1009650" cy="0"/>
           </a:xfrm>
           <a:prstGeom prst="straightConnector1">
@@ -4690,7 +4695,7 @@
         </p:nvSpPr>
         <p:spPr>
           <a:xfrm>
-            <a:off x="7933878" y="3503652"/>
+            <a:off x="8124378" y="3503652"/>
             <a:ext cx="340158" cy="461665"/>
           </a:xfrm>
           <a:prstGeom prst="rect">
@@ -4729,7 +4734,7 @@
         </p:nvCxnSpPr>
         <p:spPr>
           <a:xfrm flipV="1">
-            <a:off x="9658350" y="4057650"/>
+            <a:off x="9848850" y="4057650"/>
             <a:ext cx="1009650" cy="1"/>
           </a:xfrm>
           <a:prstGeom prst="straightConnector1">
@@ -4768,7 +4773,7 @@
         </p:nvSpPr>
         <p:spPr>
           <a:xfrm>
-            <a:off x="10026550" y="3516485"/>
+            <a:off x="10217050" y="3516485"/>
             <a:ext cx="340158" cy="461665"/>
           </a:xfrm>
           <a:prstGeom prst="rect">
@@ -4806,7 +4811,7 @@
         </p:nvCxnSpPr>
         <p:spPr>
           <a:xfrm rot="16200000" flipV="1">
-            <a:off x="5953126" y="-1752601"/>
+            <a:off x="6143626" y="-1752601"/>
             <a:ext cx="12700" cy="10525125"/>
           </a:xfrm>
           <a:prstGeom prst="curvedConnector3">
@@ -4847,7 +4852,7 @@
         </p:nvSpPr>
         <p:spPr>
           <a:xfrm>
-            <a:off x="5419227" y="2648962"/>
+            <a:off x="5609727" y="2648962"/>
             <a:ext cx="340158" cy="461665"/>
           </a:xfrm>
           <a:prstGeom prst="rect">
@@ -4868,53 +4873,6 @@
           </a:p>
         </p:txBody>
       </p:sp>
-      <p:cxnSp>
-        <p:nvCxnSpPr>
-          <p:cNvPr id="64" name="Connector: Curved 63">
-            <a:extLst>
-              <a:ext uri="{FF2B5EF4-FFF2-40B4-BE49-F238E27FC236}">
-                <a16:creationId xmlns:a16="http://schemas.microsoft.com/office/drawing/2014/main" id="{07EF0E5F-14E4-457C-9D33-076393C16E88}"/>
-              </a:ext>
-            </a:extLst>
-          </p:cNvPr>
-          <p:cNvCxnSpPr>
-            <a:cxnSpLocks/>
-            <a:stCxn id="10" idx="3"/>
-            <a:endCxn id="10" idx="1"/>
-          </p:cNvCxnSpPr>
-          <p:nvPr/>
-        </p:nvCxnSpPr>
-        <p:spPr>
-          <a:xfrm rot="5400000" flipH="1">
-            <a:off x="-83985" y="4057650"/>
-            <a:ext cx="774547" cy="12700"/>
-          </a:xfrm>
-          <a:prstGeom prst="curvedConnector5">
-            <a:avLst>
-              <a:gd name="adj1" fmla="val -29514"/>
-              <a:gd name="adj2" fmla="val 2265039"/>
-              <a:gd name="adj3" fmla="val 129514"/>
-            </a:avLst>
-          </a:prstGeom>
-          <a:ln>
-            <a:tailEnd type="triangle"/>
-          </a:ln>
-        </p:spPr>
-        <p:style>
-          <a:lnRef idx="1">
-            <a:schemeClr val="dk1"/>
-          </a:lnRef>
-          <a:fillRef idx="0">
-            <a:schemeClr val="dk1"/>
-          </a:fillRef>
-          <a:effectRef idx="0">
-            <a:schemeClr val="dk1"/>
-          </a:effectRef>
-          <a:fontRef idx="minor">
-            <a:schemeClr val="tx1"/>
-          </a:fontRef>
-        </p:style>
-      </p:cxnSp>
       <p:cxnSp>
         <p:nvCxnSpPr>
           <p:cNvPr id="65" name="Connector: Curved 64">
@@ -4933,7 +4891,7 @@
         </p:nvCxnSpPr>
         <p:spPr>
           <a:xfrm rot="5400000" flipH="1">
-            <a:off x="2134470" y="4171083"/>
+            <a:off x="2324970" y="4171083"/>
             <a:ext cx="387273" cy="160414"/>
           </a:xfrm>
           <a:prstGeom prst="curvedConnector4">
@@ -4979,7 +4937,7 @@
         </p:nvCxnSpPr>
         <p:spPr>
           <a:xfrm rot="5400000" flipH="1">
-            <a:off x="4239495" y="4171082"/>
+            <a:off x="4429995" y="4171082"/>
             <a:ext cx="387273" cy="160414"/>
           </a:xfrm>
           <a:prstGeom prst="curvedConnector4">
@@ -5025,7 +4983,7 @@
         </p:nvCxnSpPr>
         <p:spPr>
           <a:xfrm rot="5400000" flipH="1">
-            <a:off x="6344520" y="4171081"/>
+            <a:off x="6535020" y="4171081"/>
             <a:ext cx="387273" cy="160414"/>
           </a:xfrm>
           <a:prstGeom prst="curvedConnector4">
@@ -5055,10 +5013,10 @@
       </p:cxnSp>
       <p:sp>
         <p:nvSpPr>
-          <p:cNvPr id="75" name="TextBox 74">
-            <a:extLst>
-              <a:ext uri="{FF2B5EF4-FFF2-40B4-BE49-F238E27FC236}">
-                <a16:creationId xmlns:a16="http://schemas.microsoft.com/office/drawing/2014/main" id="{D7170BA6-C319-43AF-A54C-9540103E3414}"/>
+          <p:cNvPr id="77" name="TextBox 76">
+            <a:extLst>
+              <a:ext uri="{FF2B5EF4-FFF2-40B4-BE49-F238E27FC236}">
+                <a16:creationId xmlns:a16="http://schemas.microsoft.com/office/drawing/2014/main" id="{0A15C1A2-79BB-46D3-A904-31043198AFAA}"/>
               </a:ext>
             </a:extLst>
           </p:cNvPr>
@@ -5067,7 +5025,7 @@
         </p:nvSpPr>
         <p:spPr>
           <a:xfrm>
-            <a:off x="-43220" y="2969175"/>
+            <a:off x="1824397" y="4368158"/>
             <a:ext cx="340158" cy="461665"/>
           </a:xfrm>
           <a:prstGeom prst="rect">
@@ -5090,10 +5048,10 @@
       </p:sp>
       <p:sp>
         <p:nvSpPr>
-          <p:cNvPr id="77" name="TextBox 76">
-            <a:extLst>
-              <a:ext uri="{FF2B5EF4-FFF2-40B4-BE49-F238E27FC236}">
-                <a16:creationId xmlns:a16="http://schemas.microsoft.com/office/drawing/2014/main" id="{0A15C1A2-79BB-46D3-A904-31043198AFAA}"/>
+          <p:cNvPr id="78" name="TextBox 77">
+            <a:extLst>
+              <a:ext uri="{FF2B5EF4-FFF2-40B4-BE49-F238E27FC236}">
+                <a16:creationId xmlns:a16="http://schemas.microsoft.com/office/drawing/2014/main" id="{537E0A5F-2EF8-4B9D-ACDF-B1EE95C06032}"/>
               </a:ext>
             </a:extLst>
           </p:cNvPr>
@@ -5102,7 +5060,7 @@
         </p:nvSpPr>
         <p:spPr>
           <a:xfrm>
-            <a:off x="1633897" y="4368158"/>
+            <a:off x="4021983" y="4100662"/>
             <a:ext cx="340158" cy="461665"/>
           </a:xfrm>
           <a:prstGeom prst="rect">
@@ -5125,10 +5083,10 @@
       </p:sp>
       <p:sp>
         <p:nvSpPr>
-          <p:cNvPr id="78" name="TextBox 77">
-            <a:extLst>
-              <a:ext uri="{FF2B5EF4-FFF2-40B4-BE49-F238E27FC236}">
-                <a16:creationId xmlns:a16="http://schemas.microsoft.com/office/drawing/2014/main" id="{537E0A5F-2EF8-4B9D-ACDF-B1EE95C06032}"/>
+          <p:cNvPr id="79" name="TextBox 78">
+            <a:extLst>
+              <a:ext uri="{FF2B5EF4-FFF2-40B4-BE49-F238E27FC236}">
+                <a16:creationId xmlns:a16="http://schemas.microsoft.com/office/drawing/2014/main" id="{95B45602-3D4E-476E-8809-B3BC93E195FA}"/>
               </a:ext>
             </a:extLst>
           </p:cNvPr>
@@ -5137,42 +5095,7 @@
         </p:nvSpPr>
         <p:spPr>
           <a:xfrm>
-            <a:off x="3831483" y="4100662"/>
-            <a:ext cx="340158" cy="461665"/>
-          </a:xfrm>
-          <a:prstGeom prst="rect">
-            <a:avLst/>
-          </a:prstGeom>
-          <a:noFill/>
-        </p:spPr>
-        <p:txBody>
-          <a:bodyPr wrap="none" rtlCol="0">
-            <a:spAutoFit/>
-          </a:bodyPr>
-          <a:lstStyle/>
-          <a:p>
-            <a:r>
-              <a:rPr lang="en-US" sz="2400" dirty="0"/>
-              <a:t>6</a:t>
-            </a:r>
-          </a:p>
-        </p:txBody>
-      </p:sp>
-      <p:sp>
-        <p:nvSpPr>
-          <p:cNvPr id="79" name="TextBox 78">
-            <a:extLst>
-              <a:ext uri="{FF2B5EF4-FFF2-40B4-BE49-F238E27FC236}">
-                <a16:creationId xmlns:a16="http://schemas.microsoft.com/office/drawing/2014/main" id="{95B45602-3D4E-476E-8809-B3BC93E195FA}"/>
-              </a:ext>
-            </a:extLst>
-          </p:cNvPr>
-          <p:cNvSpPr txBox="1"/>
-          <p:nvPr/>
-        </p:nvSpPr>
-        <p:spPr>
-          <a:xfrm>
-            <a:off x="5921942" y="4229357"/>
+            <a:off x="6112442" y="4229357"/>
             <a:ext cx="340158" cy="461665"/>
           </a:xfrm>
           <a:prstGeom prst="rect">
@@ -5211,7 +5134,7 @@
         </p:nvCxnSpPr>
         <p:spPr>
           <a:xfrm rot="5400000" flipH="1">
-            <a:off x="8449545" y="4171081"/>
+            <a:off x="8640045" y="4171081"/>
             <a:ext cx="387273" cy="160414"/>
           </a:xfrm>
           <a:prstGeom prst="curvedConnector4">
@@ -5253,7 +5176,7 @@
         </p:nvSpPr>
         <p:spPr>
           <a:xfrm>
-            <a:off x="8024695" y="4181595"/>
+            <a:off x="8215195" y="4181595"/>
             <a:ext cx="340158" cy="461665"/>
           </a:xfrm>
           <a:prstGeom prst="rect">
@@ -5288,7 +5211,7 @@
         </p:nvSpPr>
         <p:spPr>
           <a:xfrm>
-            <a:off x="10163175" y="4214092"/>
+            <a:off x="10353675" y="4214092"/>
             <a:ext cx="340158" cy="461665"/>
           </a:xfrm>
           <a:prstGeom prst="rect">
@@ -5327,7 +5250,7 @@
         </p:nvCxnSpPr>
         <p:spPr>
           <a:xfrm rot="5400000" flipH="1">
-            <a:off x="10554570" y="4171080"/>
+            <a:off x="10745070" y="4171080"/>
             <a:ext cx="387273" cy="160414"/>
           </a:xfrm>
           <a:prstGeom prst="curvedConnector4">
@@ -5585,10 +5508,10 @@
       </p:sp>
       <p:sp>
         <p:nvSpPr>
-          <p:cNvPr id="10" name="TextBox 9">
-            <a:extLst>
-              <a:ext uri="{FF2B5EF4-FFF2-40B4-BE49-F238E27FC236}">
-                <a16:creationId xmlns:a16="http://schemas.microsoft.com/office/drawing/2014/main" id="{8D4FDE93-1F6E-43C8-80E5-9A45E0D82934}"/>
+          <p:cNvPr id="8" name="TextBox 7">
+            <a:extLst>
+              <a:ext uri="{FF2B5EF4-FFF2-40B4-BE49-F238E27FC236}">
+                <a16:creationId xmlns:a16="http://schemas.microsoft.com/office/drawing/2014/main" id="{E9366EC9-1042-41C1-BC82-0B3B56442BAC}"/>
               </a:ext>
             </a:extLst>
           </p:cNvPr>
@@ -5597,8 +5520,8 @@
         </p:nvSpPr>
         <p:spPr>
           <a:xfrm>
-            <a:off x="6010275" y="-1"/>
-            <a:ext cx="5391150" cy="2585323"/>
+            <a:off x="6010274" y="-1"/>
+            <a:ext cx="6181725" cy="2862322"/>
           </a:xfrm>
           <a:prstGeom prst="rect">
             <a:avLst/>
@@ -5625,7 +5548,7 @@
           <a:p>
             <a:r>
               <a:rPr lang="en-US" dirty="0"/>
-              <a:t>0.   Play button pressed (Crucible ready)</a:t>
+              <a:t>0.   Play button pressed in both idle status (Crucible ready)</a:t>
             </a:r>
           </a:p>
           <a:p>
@@ -5643,7 +5566,7 @@
             </a:pPr>
             <a:r>
               <a:rPr lang="en-US" dirty="0"/>
-              <a:t>Furnace ramp heating</a:t>
+              <a:t>Furnace heating is done</a:t>
             </a:r>
           </a:p>
           <a:p>
@@ -5679,7 +5602,7 @@
             </a:pPr>
             <a:r>
               <a:rPr lang="en-US" dirty="0"/>
-              <a:t>Pause button pressed/unpressed</a:t>
+              <a:t>Pause button pressed or Play button pressed while robot is paused (indicating that previously there is a pause event)</a:t>
             </a:r>
           </a:p>
         </p:txBody>
@@ -5861,10 +5784,10 @@
       </p:sp>
       <p:sp>
         <p:nvSpPr>
-          <p:cNvPr id="10" name="TextBox 9">
-            <a:extLst>
-              <a:ext uri="{FF2B5EF4-FFF2-40B4-BE49-F238E27FC236}">
-                <a16:creationId xmlns:a16="http://schemas.microsoft.com/office/drawing/2014/main" id="{DCD2F076-673E-44AB-9C8A-FE7FF029D64E}"/>
+          <p:cNvPr id="11" name="TextBox 10">
+            <a:extLst>
+              <a:ext uri="{FF2B5EF4-FFF2-40B4-BE49-F238E27FC236}">
+                <a16:creationId xmlns:a16="http://schemas.microsoft.com/office/drawing/2014/main" id="{A3FA0519-A0E0-4D39-9BDE-B9159E412E76}"/>
               </a:ext>
             </a:extLst>
           </p:cNvPr>
@@ -5873,8 +5796,8 @@
         </p:nvSpPr>
         <p:spPr>
           <a:xfrm>
-            <a:off x="6010275" y="-1"/>
-            <a:ext cx="5391150" cy="2585323"/>
+            <a:off x="6010274" y="3253338"/>
+            <a:ext cx="6181725" cy="923330"/>
           </a:xfrm>
           <a:prstGeom prst="rect">
             <a:avLst/>
@@ -5889,19 +5812,7 @@
           <a:p>
             <a:r>
               <a:rPr lang="en-US" dirty="0"/>
-              <a:t>Define events:</a:t>
-            </a:r>
-          </a:p>
-          <a:p>
-            <a:r>
-              <a:rPr lang="en-US" dirty="0"/>
-              <a:t>-1.  Stop button pressed or any exception thrown</a:t>
-            </a:r>
-          </a:p>
-          <a:p>
-            <a:r>
-              <a:rPr lang="en-US" dirty="0"/>
-              <a:t>0.   Play button pressed (Crucible ready)</a:t>
+              <a:t>Robot Attributes:</a:t>
             </a:r>
           </a:p>
           <a:p>
@@ -5910,7 +5821,7 @@
             </a:pPr>
             <a:r>
               <a:rPr lang="en-US" dirty="0"/>
-              <a:t>Robot done loading in crucible into the furnace</a:t>
+              <a:t>Status: idle, in, out</a:t>
             </a:r>
           </a:p>
           <a:p>
@@ -5919,53 +5830,17 @@
             </a:pPr>
             <a:r>
               <a:rPr lang="en-US" dirty="0"/>
-              <a:t>Furnace ramp heating</a:t>
-            </a:r>
-          </a:p>
-          <a:p>
-            <a:pPr marL="342900" indent="-342900">
-              <a:buAutoNum type="arabicPeriod"/>
-            </a:pPr>
-            <a:r>
-              <a:rPr lang="en-US" dirty="0"/>
-              <a:t>Dwelling done</a:t>
-            </a:r>
-          </a:p>
-          <a:p>
-            <a:pPr marL="342900" indent="-342900">
-              <a:buAutoNum type="arabicPeriod"/>
-            </a:pPr>
-            <a:r>
-              <a:rPr lang="en-US" dirty="0"/>
-              <a:t>Furnace cooled down</a:t>
-            </a:r>
-          </a:p>
-          <a:p>
-            <a:pPr marL="342900" indent="-342900">
-              <a:buAutoNum type="arabicPeriod"/>
-            </a:pPr>
-            <a:r>
-              <a:rPr lang="en-US" dirty="0"/>
-              <a:t>Robot done taking out crucible</a:t>
-            </a:r>
-          </a:p>
-          <a:p>
-            <a:pPr marL="342900" indent="-342900">
-              <a:buAutoNum type="arabicPeriod"/>
-            </a:pPr>
-            <a:r>
-              <a:rPr lang="en-US" dirty="0"/>
-              <a:t>Pause button pressed/unpressed</a:t>
-            </a:r>
-          </a:p>
-        </p:txBody>
-      </p:sp>
-      <p:sp>
-        <p:nvSpPr>
-          <p:cNvPr id="11" name="TextBox 10">
-            <a:extLst>
-              <a:ext uri="{FF2B5EF4-FFF2-40B4-BE49-F238E27FC236}">
-                <a16:creationId xmlns:a16="http://schemas.microsoft.com/office/drawing/2014/main" id="{A3FA0519-A0E0-4D39-9BDE-B9159E412E76}"/>
+              <a:t>Mode: PLAYING, STOPPED, PAUSED</a:t>
+            </a:r>
+          </a:p>
+        </p:txBody>
+      </p:sp>
+      <p:sp>
+        <p:nvSpPr>
+          <p:cNvPr id="7" name="TextBox 6">
+            <a:extLst>
+              <a:ext uri="{FF2B5EF4-FFF2-40B4-BE49-F238E27FC236}">
+                <a16:creationId xmlns:a16="http://schemas.microsoft.com/office/drawing/2014/main" id="{5E08CC63-05D5-4889-97C9-533F5005FE60}"/>
               </a:ext>
             </a:extLst>
           </p:cNvPr>
@@ -5974,8 +5849,8 @@
         </p:nvSpPr>
         <p:spPr>
           <a:xfrm>
-            <a:off x="6010274" y="3253338"/>
-            <a:ext cx="6181725" cy="923330"/>
+            <a:off x="6010274" y="-1"/>
+            <a:ext cx="6181725" cy="2862322"/>
           </a:xfrm>
           <a:prstGeom prst="rect">
             <a:avLst/>
@@ -5990,7 +5865,19 @@
           <a:p>
             <a:r>
               <a:rPr lang="en-US" dirty="0"/>
-              <a:t>Robot Attributes:</a:t>
+              <a:t>Define events:</a:t>
+            </a:r>
+          </a:p>
+          <a:p>
+            <a:r>
+              <a:rPr lang="en-US" dirty="0"/>
+              <a:t>-1.  Stop button pressed or any exception thrown</a:t>
+            </a:r>
+          </a:p>
+          <a:p>
+            <a:r>
+              <a:rPr lang="en-US" dirty="0"/>
+              <a:t>0.   Play button pressed in both idle status (Crucible ready)</a:t>
             </a:r>
           </a:p>
           <a:p>
@@ -5999,7 +5886,7 @@
             </a:pPr>
             <a:r>
               <a:rPr lang="en-US" dirty="0"/>
-              <a:t>Status: idle, in, out</a:t>
+              <a:t>Robot done loading in crucible into the furnace</a:t>
             </a:r>
           </a:p>
           <a:p>
@@ -6008,7 +5895,43 @@
             </a:pPr>
             <a:r>
               <a:rPr lang="en-US" dirty="0"/>
-              <a:t>Mode: PLAYING, STOPPED, PAUSED</a:t>
+              <a:t>Furnace heating is done</a:t>
+            </a:r>
+          </a:p>
+          <a:p>
+            <a:pPr marL="342900" indent="-342900">
+              <a:buAutoNum type="arabicPeriod"/>
+            </a:pPr>
+            <a:r>
+              <a:rPr lang="en-US" dirty="0"/>
+              <a:t>Dwelling done</a:t>
+            </a:r>
+          </a:p>
+          <a:p>
+            <a:pPr marL="342900" indent="-342900">
+              <a:buAutoNum type="arabicPeriod"/>
+            </a:pPr>
+            <a:r>
+              <a:rPr lang="en-US" dirty="0"/>
+              <a:t>Furnace cooled down</a:t>
+            </a:r>
+          </a:p>
+          <a:p>
+            <a:pPr marL="342900" indent="-342900">
+              <a:buAutoNum type="arabicPeriod"/>
+            </a:pPr>
+            <a:r>
+              <a:rPr lang="en-US" dirty="0"/>
+              <a:t>Robot done taking out crucible</a:t>
+            </a:r>
+          </a:p>
+          <a:p>
+            <a:pPr marL="342900" indent="-342900">
+              <a:buAutoNum type="arabicPeriod"/>
+            </a:pPr>
+            <a:r>
+              <a:rPr lang="en-US" dirty="0"/>
+              <a:t>Pause button pressed or Play button pressed while robot is paused (indicating that previously there is a pause event)</a:t>
             </a:r>
           </a:p>
         </p:txBody>

</xml_diff>